<commit_message>
Fixed plot anatomy figure
</commit_message>
<xml_diff>
--- a/img/basic-elements-of-plot.pptx
+++ b/img/basic-elements-of-plot.pptx
@@ -104,6 +104,11 @@
       </a:defRPr>
     </a:lvl9pPr>
   </p:defaultTextStyle>
+  <p:extLst>
+    <p:ext uri="{EFAFB233-063F-42B5-8137-9DF3F51BA10A}">
+      <p15:sldGuideLst xmlns:p15="http://schemas.microsoft.com/office/powerpoint/2012/main"/>
+    </p:ext>
+  </p:extLst>
 </p:presentation>
 </file>
 
@@ -238,7 +243,7 @@
           <a:p>
             <a:fld id="{3E973B20-A5D9-4241-86B6-26A557C7F48E}" type="datetimeFigureOut">
               <a:rPr lang="en-US" smtClean="0"/>
-              <a:t>16.10.2016</a:t>
+              <a:t>17.10.2016</a:t>
             </a:fld>
             <a:endParaRPr lang="en-US"/>
           </a:p>
@@ -408,7 +413,7 @@
           <a:p>
             <a:fld id="{3E973B20-A5D9-4241-86B6-26A557C7F48E}" type="datetimeFigureOut">
               <a:rPr lang="en-US" smtClean="0"/>
-              <a:t>16.10.2016</a:t>
+              <a:t>17.10.2016</a:t>
             </a:fld>
             <a:endParaRPr lang="en-US"/>
           </a:p>
@@ -588,7 +593,7 @@
           <a:p>
             <a:fld id="{3E973B20-A5D9-4241-86B6-26A557C7F48E}" type="datetimeFigureOut">
               <a:rPr lang="en-US" smtClean="0"/>
-              <a:t>16.10.2016</a:t>
+              <a:t>17.10.2016</a:t>
             </a:fld>
             <a:endParaRPr lang="en-US"/>
           </a:p>
@@ -758,7 +763,7 @@
           <a:p>
             <a:fld id="{3E973B20-A5D9-4241-86B6-26A557C7F48E}" type="datetimeFigureOut">
               <a:rPr lang="en-US" smtClean="0"/>
-              <a:t>16.10.2016</a:t>
+              <a:t>17.10.2016</a:t>
             </a:fld>
             <a:endParaRPr lang="en-US"/>
           </a:p>
@@ -1004,7 +1009,7 @@
           <a:p>
             <a:fld id="{3E973B20-A5D9-4241-86B6-26A557C7F48E}" type="datetimeFigureOut">
               <a:rPr lang="en-US" smtClean="0"/>
-              <a:t>16.10.2016</a:t>
+              <a:t>17.10.2016</a:t>
             </a:fld>
             <a:endParaRPr lang="en-US"/>
           </a:p>
@@ -1236,7 +1241,7 @@
           <a:p>
             <a:fld id="{3E973B20-A5D9-4241-86B6-26A557C7F48E}" type="datetimeFigureOut">
               <a:rPr lang="en-US" smtClean="0"/>
-              <a:t>16.10.2016</a:t>
+              <a:t>17.10.2016</a:t>
             </a:fld>
             <a:endParaRPr lang="en-US"/>
           </a:p>
@@ -1603,7 +1608,7 @@
           <a:p>
             <a:fld id="{3E973B20-A5D9-4241-86B6-26A557C7F48E}" type="datetimeFigureOut">
               <a:rPr lang="en-US" smtClean="0"/>
-              <a:t>16.10.2016</a:t>
+              <a:t>17.10.2016</a:t>
             </a:fld>
             <a:endParaRPr lang="en-US"/>
           </a:p>
@@ -1721,7 +1726,7 @@
           <a:p>
             <a:fld id="{3E973B20-A5D9-4241-86B6-26A557C7F48E}" type="datetimeFigureOut">
               <a:rPr lang="en-US" smtClean="0"/>
-              <a:t>16.10.2016</a:t>
+              <a:t>17.10.2016</a:t>
             </a:fld>
             <a:endParaRPr lang="en-US"/>
           </a:p>
@@ -1816,7 +1821,7 @@
           <a:p>
             <a:fld id="{3E973B20-A5D9-4241-86B6-26A557C7F48E}" type="datetimeFigureOut">
               <a:rPr lang="en-US" smtClean="0"/>
-              <a:t>16.10.2016</a:t>
+              <a:t>17.10.2016</a:t>
             </a:fld>
             <a:endParaRPr lang="en-US"/>
           </a:p>
@@ -2093,7 +2098,7 @@
           <a:p>
             <a:fld id="{3E973B20-A5D9-4241-86B6-26A557C7F48E}" type="datetimeFigureOut">
               <a:rPr lang="en-US" smtClean="0"/>
-              <a:t>16.10.2016</a:t>
+              <a:t>17.10.2016</a:t>
             </a:fld>
             <a:endParaRPr lang="en-US"/>
           </a:p>
@@ -2346,7 +2351,7 @@
           <a:p>
             <a:fld id="{3E973B20-A5D9-4241-86B6-26A557C7F48E}" type="datetimeFigureOut">
               <a:rPr lang="en-US" smtClean="0"/>
-              <a:t>16.10.2016</a:t>
+              <a:t>17.10.2016</a:t>
             </a:fld>
             <a:endParaRPr lang="en-US"/>
           </a:p>
@@ -2559,7 +2564,7 @@
           <a:p>
             <a:fld id="{3E973B20-A5D9-4241-86B6-26A557C7F48E}" type="datetimeFigureOut">
               <a:rPr lang="en-US" smtClean="0"/>
-              <a:t>16.10.2016</a:t>
+              <a:t>17.10.2016</a:t>
             </a:fld>
             <a:endParaRPr lang="en-US"/>
           </a:p>
@@ -3961,7 +3966,7 @@
                 <a:latin typeface="Arial" panose="020B0604020202020204" pitchFamily="34" charset="0"/>
                 <a:cs typeface="Arial" panose="020B0604020202020204" pitchFamily="34" charset="0"/>
               </a:rPr>
-              <a:t>y –</a:t>
+              <a:t>x –</a:t>
             </a:r>
             <a:r>
               <a:rPr lang="fi-FI" sz="1200" dirty="0" err="1">

</xml_diff>